<commit_message>
Finalise csched jif printout + poster
</commit_message>
<xml_diff>
--- a/poster/poster.pptx
+++ b/poster/poster.pptx
@@ -257,7 +257,7 @@
               <a:pPr>
                 <a:defRPr/>
               </a:pPr>
-              <a:t>10/10/2017</a:t>
+              <a:t>10/16/2017</a:t>
             </a:fld>
             <a:endParaRPr lang="en-US"/>
           </a:p>
@@ -857,7 +857,7 @@
               <a:pPr>
                 <a:defRPr/>
               </a:pPr>
-              <a:t>10/10/2017</a:t>
+              <a:t>10/16/2017</a:t>
             </a:fld>
             <a:endParaRPr lang="en-US"/>
           </a:p>
@@ -1883,7 +1883,7 @@
               <a:pPr>
                 <a:defRPr/>
               </a:pPr>
-              <a:t>10/10/2017</a:t>
+              <a:t>10/16/2017</a:t>
             </a:fld>
             <a:endParaRPr lang="en-US"/>
           </a:p>
@@ -3440,6 +3440,66 @@
               </a:rPr>
               <a:t>CONCLUSIONS</a:t>
             </a:r>
+          </a:p>
+          <a:p>
+            <a:pPr lvl="0" eaLnBrk="1" hangingPunct="1">
+              <a:spcBef>
+                <a:spcPct val="0"/>
+              </a:spcBef>
+            </a:pPr>
+            <a:r>
+              <a:rPr lang="en-US" dirty="0">
+                <a:latin typeface="Helvetica Neue" charset="0"/>
+                <a:cs typeface="Helvetica Neue" charset="0"/>
+              </a:rPr>
+              <a:t>Information Flow has potential in any context where verifying its correctness with respect to security is relevant.</a:t>
+            </a:r>
+            <a:br>
+              <a:rPr lang="en-US" dirty="0">
+                <a:latin typeface="Helvetica Neue" charset="0"/>
+                <a:cs typeface="Helvetica Neue" charset="0"/>
+              </a:rPr>
+            </a:br>
+            <a:br>
+              <a:rPr lang="en-US" dirty="0">
+                <a:latin typeface="Helvetica Neue" charset="0"/>
+                <a:cs typeface="Helvetica Neue" charset="0"/>
+              </a:rPr>
+            </a:br>
+            <a:r>
+              <a:rPr lang="en-US" dirty="0">
+                <a:latin typeface="Helvetica Neue" charset="0"/>
+                <a:cs typeface="Helvetica Neue" charset="0"/>
+              </a:rPr>
+              <a:t>Neither JIF nor Paragon are mature implementations, but Paragon’s ease and expressivity for dynamic policies make it more practical for real world development.</a:t>
+            </a:r>
+            <a:br>
+              <a:rPr lang="en-US" dirty="0">
+                <a:latin typeface="Helvetica Neue" charset="0"/>
+                <a:cs typeface="Helvetica Neue" charset="0"/>
+              </a:rPr>
+            </a:br>
+            <a:endParaRPr lang="en-US" dirty="0">
+              <a:latin typeface="Helvetica Neue" charset="0"/>
+              <a:cs typeface="Helvetica Neue" charset="0"/>
+            </a:endParaRPr>
+          </a:p>
+          <a:p>
+            <a:pPr lvl="0" eaLnBrk="1" hangingPunct="1">
+              <a:spcBef>
+                <a:spcPct val="0"/>
+              </a:spcBef>
+            </a:pPr>
+            <a:r>
+              <a:rPr lang="en-US" sz="1800" dirty="0">
+                <a:solidFill>
+                  <a:prstClr val="black"/>
+                </a:solidFill>
+                <a:latin typeface="Bodoni MT" charset="0"/>
+                <a:cs typeface="Helvetica Neue" charset="0"/>
+              </a:rPr>
+              <a:t>FURTHER WORK</a:t>
+            </a:r>
             <a:endParaRPr lang="en-US" dirty="0">
               <a:solidFill>
                 <a:prstClr val="black"/>
@@ -3449,109 +3509,60 @@
             </a:endParaRPr>
           </a:p>
           <a:p>
-            <a:pPr lvl="0"/>
-            <a:r>
-              <a:rPr lang="en-US" dirty="0">
-                <a:solidFill>
-                  <a:prstClr val="black"/>
-                </a:solidFill>
-                <a:latin typeface="Helvetica Neue" charset="0"/>
-                <a:cs typeface="Helvetica Neue" charset="0"/>
-              </a:rPr>
-              <a:t>Information Flow and security typing have many </a:t>
-            </a:r>
-            <a:r>
-              <a:rPr lang="en-US">
-                <a:solidFill>
-                  <a:prstClr val="black"/>
-                </a:solidFill>
-                <a:latin typeface="Helvetica Neue" charset="0"/>
-                <a:cs typeface="Helvetica Neue" charset="0"/>
-              </a:rPr>
-              <a:t>potential applications.</a:t>
-            </a:r>
-            <a:endParaRPr lang="en-US" dirty="0">
-              <a:solidFill>
-                <a:prstClr val="black"/>
-              </a:solidFill>
-              <a:latin typeface="Helvetica Neue" charset="0"/>
-              <a:cs typeface="Helvetica Neue" charset="0"/>
-            </a:endParaRPr>
-          </a:p>
-          <a:p>
-            <a:pPr lvl="0"/>
-            <a:endParaRPr lang="en-US" dirty="0">
-              <a:solidFill>
-                <a:prstClr val="black"/>
-              </a:solidFill>
-              <a:latin typeface="Helvetica Neue" charset="0"/>
-              <a:cs typeface="Helvetica Neue" charset="0"/>
-            </a:endParaRPr>
-          </a:p>
-          <a:p>
-            <a:pPr lvl="0"/>
-            <a:r>
-              <a:rPr lang="en-US" dirty="0">
-                <a:solidFill>
-                  <a:prstClr val="black"/>
-                </a:solidFill>
-                <a:latin typeface="Helvetica Neue" charset="0"/>
-                <a:cs typeface="Helvetica Neue" charset="0"/>
-              </a:rPr>
-              <a:t>Neither JIF nor Paragon are mature enough to be viable implementations.</a:t>
-            </a:r>
-          </a:p>
-          <a:p>
-            <a:pPr lvl="0"/>
-            <a:endParaRPr lang="en-US" dirty="0">
-              <a:solidFill>
-                <a:prstClr val="black"/>
-              </a:solidFill>
-              <a:latin typeface="Helvetica Neue" charset="0"/>
-              <a:cs typeface="Helvetica Neue" charset="0"/>
-            </a:endParaRPr>
-          </a:p>
-          <a:p>
-            <a:pPr lvl="0"/>
-            <a:r>
-              <a:rPr lang="en-US" dirty="0">
-                <a:solidFill>
-                  <a:prstClr val="black"/>
-                </a:solidFill>
-                <a:latin typeface="Helvetica Neue" charset="0"/>
-                <a:cs typeface="Helvetica Neue" charset="0"/>
-              </a:rPr>
-              <a:t>JIF’s policy model is more complex and requires more programmer burden.</a:t>
-            </a:r>
-          </a:p>
-          <a:p>
-            <a:pPr lvl="0"/>
-            <a:endParaRPr lang="en-US" dirty="0">
-              <a:solidFill>
-                <a:prstClr val="black"/>
-              </a:solidFill>
-              <a:latin typeface="Helvetica Neue" charset="0"/>
-              <a:cs typeface="Helvetica Neue" charset="0"/>
-            </a:endParaRPr>
-          </a:p>
-          <a:p>
-            <a:pPr lvl="0"/>
-            <a:r>
-              <a:rPr lang="en-US" dirty="0">
-                <a:solidFill>
-                  <a:prstClr val="black"/>
-                </a:solidFill>
-                <a:latin typeface="Helvetica Neue" charset="0"/>
-                <a:cs typeface="Helvetica Neue" charset="0"/>
-              </a:rPr>
-              <a:t>Paragon’s logic-based policies are both simpler to understand and more powerful.</a:t>
-            </a:r>
-          </a:p>
-          <a:p>
-            <a:endParaRPr lang="en-US" dirty="0">
-              <a:latin typeface="Helvetica Neue" charset="0"/>
-              <a:cs typeface="Helvetica Neue" charset="0"/>
-            </a:endParaRPr>
+            <a:r>
+              <a:rPr lang="en-US" dirty="0">
+                <a:latin typeface="Helvetica Neue" charset="0"/>
+                <a:cs typeface="Helvetica Neue" charset="0"/>
+              </a:rPr>
+              <a:t>Some other approaches:</a:t>
+            </a:r>
+          </a:p>
+          <a:p>
+            <a:pPr marL="285750" indent="-285750">
+              <a:buFont typeface="Arial" panose="020B0604020202020204" pitchFamily="34" charset="0"/>
+              <a:buChar char="•"/>
+            </a:pPr>
+            <a:r>
+              <a:rPr lang="en-US" dirty="0" err="1">
+                <a:latin typeface="Helvetica Neue" charset="0"/>
+                <a:cs typeface="Helvetica Neue" charset="0"/>
+              </a:rPr>
+              <a:t>LIFTy</a:t>
+            </a:r>
+            <a:r>
+              <a:rPr lang="en-US" dirty="0">
+                <a:latin typeface="Helvetica Neue" charset="0"/>
+                <a:cs typeface="Helvetica Neue" charset="0"/>
+              </a:rPr>
+              <a:t>: Haskell dialect which </a:t>
+            </a:r>
+            <a:r>
+              <a:rPr lang="en-US" dirty="0" err="1">
+                <a:latin typeface="Helvetica Neue" charset="0"/>
+                <a:cs typeface="Helvetica Neue" charset="0"/>
+              </a:rPr>
+              <a:t>synthesises</a:t>
+            </a:r>
+            <a:r>
+              <a:rPr lang="en-US" dirty="0">
+                <a:latin typeface="Helvetica Neue" charset="0"/>
+                <a:cs typeface="Helvetica Neue" charset="0"/>
+              </a:rPr>
+              <a:t> runtime checks based on refinement types</a:t>
+            </a:r>
+          </a:p>
+          <a:p>
+            <a:pPr marL="285750" indent="-285750">
+              <a:buFont typeface="Arial" panose="020B0604020202020204" pitchFamily="34" charset="0"/>
+              <a:buChar char="•"/>
+            </a:pPr>
+            <a:r>
+              <a:rPr lang="en-US" dirty="0">
+                <a:latin typeface="Helvetica Neue" charset="0"/>
+                <a:cs typeface="Helvetica Neue" charset="0"/>
+              </a:rPr>
+              <a:t>JRIF: extension of JIF to allow for dynamic policy using state automata</a:t>
+            </a:r>
           </a:p>
         </p:txBody>
       </p:sp>

</xml_diff>